<commit_message>
a bunch of content updates to the second half of the post
</commit_message>
<xml_diff>
--- a/posts/2023-07-14_data_analysis_workflow/img/fig1.pptx
+++ b/posts/2023-07-14_data_analysis_workflow/img/fig1.pptx
@@ -105,6 +105,11 @@
       </a:defRPr>
     </a:lvl9pPr>
   </p:defaultTextStyle>
+  <p:extLst>
+    <p:ext uri="{EFAFB233-063F-42B5-8137-9DF3F51BA10A}">
+      <p15:sldGuideLst xmlns:p15="http://schemas.microsoft.com/office/powerpoint/2012/main"/>
+    </p:ext>
+  </p:extLst>
 </p:presentation>
 </file>
 
@@ -3783,8 +3788,8 @@
         </p:nvCxnSpPr>
         <p:spPr>
           <a:xfrm>
-            <a:off x="8965532" y="1594031"/>
-            <a:ext cx="0" cy="7171597"/>
+            <a:off x="8965532" y="1243912"/>
+            <a:ext cx="0" cy="7521716"/>
           </a:xfrm>
           <a:prstGeom prst="line">
             <a:avLst/>
@@ -3919,7 +3924,7 @@
         </p:nvSpPr>
         <p:spPr>
           <a:xfrm>
-            <a:off x="9780442" y="2400291"/>
+            <a:off x="9976586" y="2409412"/>
             <a:ext cx="3137374" cy="658001"/>
           </a:xfrm>
           <a:prstGeom prst="rect">
@@ -4384,7 +4389,7 @@
         </p:nvGrpSpPr>
         <p:grpSpPr>
           <a:xfrm>
-            <a:off x="10063237" y="366570"/>
+            <a:off x="10153618" y="408981"/>
             <a:ext cx="2571784" cy="1227461"/>
             <a:chOff x="9166103" y="342035"/>
             <a:chExt cx="2571784" cy="1227461"/>
@@ -4535,979 +4540,895 @@
           </a:p>
         </p:txBody>
       </p:sp>
-      <p:grpSp>
-        <p:nvGrpSpPr>
-          <p:cNvPr id="79" name="Group 78">
+      <p:sp>
+        <p:nvSpPr>
+          <p:cNvPr id="29" name="Rounded Rectangle 28">
             <a:extLst>
               <a:ext uri="{FF2B5EF4-FFF2-40B4-BE49-F238E27FC236}">
-                <a16:creationId xmlns:a16="http://schemas.microsoft.com/office/drawing/2014/main" id="{0C81C24D-8DBB-3699-7483-00BBCAC39F25}"/>
+                <a16:creationId xmlns:a16="http://schemas.microsoft.com/office/drawing/2014/main" id="{11C4322E-4FDA-DC7D-4BFA-B3D6974E0664}"/>
               </a:ext>
             </a:extLst>
           </p:cNvPr>
-          <p:cNvGrpSpPr/>
+          <p:cNvSpPr/>
           <p:nvPr/>
-        </p:nvGrpSpPr>
-        <p:grpSpPr>
-          <a:xfrm>
-            <a:off x="4608320" y="3491282"/>
+        </p:nvSpPr>
+        <p:spPr>
+          <a:xfrm>
+            <a:off x="4739822" y="3513192"/>
             <a:ext cx="3461575" cy="924406"/>
-            <a:chOff x="4608320" y="3491282"/>
-            <a:chExt cx="3461575" cy="924406"/>
-          </a:xfrm>
-        </p:grpSpPr>
-        <p:sp>
-          <p:nvSpPr>
-            <p:cNvPr id="29" name="Rounded Rectangle 28">
-              <a:extLst>
-                <a:ext uri="{FF2B5EF4-FFF2-40B4-BE49-F238E27FC236}">
-                  <a16:creationId xmlns:a16="http://schemas.microsoft.com/office/drawing/2014/main" id="{11C4322E-4FDA-DC7D-4BFA-B3D6974E0664}"/>
-                </a:ext>
-              </a:extLst>
-            </p:cNvPr>
-            <p:cNvSpPr/>
-            <p:nvPr/>
-          </p:nvSpPr>
-          <p:spPr>
-            <a:xfrm>
-              <a:off x="4608320" y="3491282"/>
-              <a:ext cx="3461575" cy="924406"/>
-            </a:xfrm>
-            <a:prstGeom prst="roundRect">
-              <a:avLst/>
-            </a:prstGeom>
-            <a:noFill/>
-            <a:ln>
-              <a:solidFill>
-                <a:schemeClr val="accent1">
-                  <a:lumMod val="75000"/>
-                </a:schemeClr>
-              </a:solidFill>
-              <a:prstDash val="sysDot"/>
-            </a:ln>
-          </p:spPr>
-          <p:style>
-            <a:lnRef idx="2">
+          </a:xfrm>
+          <a:prstGeom prst="roundRect">
+            <a:avLst/>
+          </a:prstGeom>
+          <a:noFill/>
+          <a:ln w="25400">
+            <a:solidFill>
               <a:schemeClr val="accent1">
-                <a:shade val="15000"/>
+                <a:lumMod val="75000"/>
               </a:schemeClr>
-            </a:lnRef>
-            <a:fillRef idx="1">
-              <a:schemeClr val="accent1"/>
-            </a:fillRef>
-            <a:effectRef idx="0">
-              <a:schemeClr val="accent1"/>
-            </a:effectRef>
-            <a:fontRef idx="minor">
-              <a:schemeClr val="lt1"/>
-            </a:fontRef>
-          </p:style>
-          <p:txBody>
-            <a:bodyPr rtlCol="0" anchor="ctr"/>
-            <a:lstStyle/>
-            <a:p>
-              <a:pPr algn="ctr"/>
-              <a:endParaRPr lang="en-CH" sz="3676"/>
-            </a:p>
-          </p:txBody>
-        </p:sp>
-        <p:sp>
-          <p:nvSpPr>
-            <p:cNvPr id="9" name="TextBox 8">
-              <a:extLst>
-                <a:ext uri="{FF2B5EF4-FFF2-40B4-BE49-F238E27FC236}">
-                  <a16:creationId xmlns:a16="http://schemas.microsoft.com/office/drawing/2014/main" id="{A475DBF5-D90E-8A79-C023-92052D0E45A6}"/>
-                </a:ext>
-              </a:extLst>
-            </p:cNvPr>
-            <p:cNvSpPr txBox="1"/>
-            <p:nvPr/>
-          </p:nvSpPr>
-          <p:spPr>
-            <a:xfrm>
-              <a:off x="5319721" y="3605089"/>
-              <a:ext cx="2038772" cy="658001"/>
-            </a:xfrm>
-            <a:prstGeom prst="rect">
-              <a:avLst/>
-            </a:prstGeom>
-            <a:noFill/>
-          </p:spPr>
-          <p:txBody>
-            <a:bodyPr wrap="square" rtlCol="0">
-              <a:spAutoFit/>
-            </a:bodyPr>
-            <a:lstStyle/>
-            <a:p>
-              <a:r>
-                <a:rPr lang="en-GB" sz="3676" dirty="0"/>
-                <a:t>p</a:t>
-              </a:r>
-              <a:r>
-                <a:rPr lang="en-CH" sz="3676" dirty="0"/>
-                <a:t> = 0.031</a:t>
-              </a:r>
-            </a:p>
-          </p:txBody>
-        </p:sp>
-      </p:grpSp>
-      <p:grpSp>
-        <p:nvGrpSpPr>
-          <p:cNvPr id="78" name="Group 77">
+            </a:solidFill>
+            <a:prstDash val="sysDot"/>
+          </a:ln>
+        </p:spPr>
+        <p:style>
+          <a:lnRef idx="2">
+            <a:schemeClr val="accent1">
+              <a:shade val="15000"/>
+            </a:schemeClr>
+          </a:lnRef>
+          <a:fillRef idx="1">
+            <a:schemeClr val="accent1"/>
+          </a:fillRef>
+          <a:effectRef idx="0">
+            <a:schemeClr val="accent1"/>
+          </a:effectRef>
+          <a:fontRef idx="minor">
+            <a:schemeClr val="lt1"/>
+          </a:fontRef>
+        </p:style>
+        <p:txBody>
+          <a:bodyPr rtlCol="0" anchor="ctr"/>
+          <a:lstStyle/>
+          <a:p>
+            <a:pPr algn="ctr"/>
+            <a:endParaRPr lang="en-CH" sz="3676"/>
+          </a:p>
+        </p:txBody>
+      </p:sp>
+      <p:sp>
+        <p:nvSpPr>
+          <p:cNvPr id="9" name="TextBox 8">
             <a:extLst>
               <a:ext uri="{FF2B5EF4-FFF2-40B4-BE49-F238E27FC236}">
-                <a16:creationId xmlns:a16="http://schemas.microsoft.com/office/drawing/2014/main" id="{101C38B8-F5E6-09EF-289E-E3412DA0D205}"/>
+                <a16:creationId xmlns:a16="http://schemas.microsoft.com/office/drawing/2014/main" id="{A475DBF5-D90E-8A79-C023-92052D0E45A6}"/>
               </a:ext>
             </a:extLst>
           </p:cNvPr>
-          <p:cNvGrpSpPr/>
+          <p:cNvSpPr txBox="1"/>
           <p:nvPr/>
-        </p:nvGrpSpPr>
-        <p:grpSpPr>
-          <a:xfrm>
-            <a:off x="9780442" y="3504779"/>
-            <a:ext cx="3529654" cy="924406"/>
-            <a:chOff x="9780442" y="3504779"/>
-            <a:chExt cx="3529654" cy="924406"/>
-          </a:xfrm>
-        </p:grpSpPr>
-        <p:sp>
-          <p:nvSpPr>
-            <p:cNvPr id="30" name="Rounded Rectangle 29">
-              <a:extLst>
-                <a:ext uri="{FF2B5EF4-FFF2-40B4-BE49-F238E27FC236}">
-                  <a16:creationId xmlns:a16="http://schemas.microsoft.com/office/drawing/2014/main" id="{B3AF2DD9-1F4A-4319-A4CB-273A74DF4FCF}"/>
-                </a:ext>
-              </a:extLst>
-            </p:cNvPr>
-            <p:cNvSpPr/>
-            <p:nvPr/>
-          </p:nvSpPr>
-          <p:spPr>
-            <a:xfrm>
-              <a:off x="9780442" y="3504779"/>
-              <a:ext cx="3529654" cy="924406"/>
-            </a:xfrm>
-            <a:prstGeom prst="roundRect">
-              <a:avLst/>
-            </a:prstGeom>
-            <a:noFill/>
-            <a:ln>
-              <a:solidFill>
-                <a:schemeClr val="accent1">
-                  <a:lumMod val="75000"/>
-                </a:schemeClr>
-              </a:solidFill>
-              <a:prstDash val="sysDot"/>
-            </a:ln>
-          </p:spPr>
-          <p:style>
-            <a:lnRef idx="2">
-              <a:schemeClr val="accent1">
-                <a:shade val="15000"/>
-              </a:schemeClr>
-            </a:lnRef>
-            <a:fillRef idx="1">
-              <a:schemeClr val="accent1"/>
-            </a:fillRef>
-            <a:effectRef idx="0">
-              <a:schemeClr val="accent1"/>
-            </a:effectRef>
-            <a:fontRef idx="minor">
-              <a:schemeClr val="lt1"/>
-            </a:fontRef>
-          </p:style>
-          <p:txBody>
-            <a:bodyPr rtlCol="0" anchor="ctr"/>
-            <a:lstStyle/>
-            <a:p>
-              <a:pPr algn="ctr"/>
-              <a:endParaRPr lang="en-CH" sz="3676"/>
-            </a:p>
-          </p:txBody>
-        </p:sp>
-        <p:sp>
-          <p:nvSpPr>
-            <p:cNvPr id="13" name="TextBox 12">
-              <a:extLst>
-                <a:ext uri="{FF2B5EF4-FFF2-40B4-BE49-F238E27FC236}">
-                  <a16:creationId xmlns:a16="http://schemas.microsoft.com/office/drawing/2014/main" id="{584E845F-AF38-FB52-48C1-DC9DFF08AB65}"/>
-                </a:ext>
-              </a:extLst>
-            </p:cNvPr>
-            <p:cNvSpPr txBox="1"/>
-            <p:nvPr/>
-          </p:nvSpPr>
-          <p:spPr>
-            <a:xfrm>
-              <a:off x="10186386" y="3634805"/>
-              <a:ext cx="2580714" cy="658001"/>
-            </a:xfrm>
-            <a:prstGeom prst="rect">
-              <a:avLst/>
-            </a:prstGeom>
-            <a:noFill/>
-          </p:spPr>
-          <p:txBody>
-            <a:bodyPr wrap="square" rtlCol="0">
-              <a:spAutoFit/>
-            </a:bodyPr>
-            <a:lstStyle/>
-            <a:p>
-              <a:r>
-                <a:rPr lang="en-US" sz="3676" dirty="0" err="1"/>
-                <a:t>BF</a:t>
-              </a:r>
-              <a:r>
-                <a:rPr lang="en-US" sz="3676" baseline="-25000" dirty="0" err="1"/>
-                <a:t>null</a:t>
-              </a:r>
-              <a:r>
-                <a:rPr lang="en-US" sz="3676" dirty="0"/>
-                <a:t> = 0.22</a:t>
-              </a:r>
-              <a:endParaRPr lang="en-CH" sz="3676" dirty="0"/>
-            </a:p>
-          </p:txBody>
-        </p:sp>
-      </p:grpSp>
-      <p:grpSp>
-        <p:nvGrpSpPr>
-          <p:cNvPr id="58" name="Group 57">
+        </p:nvSpPr>
+        <p:spPr>
+          <a:xfrm>
+            <a:off x="5451223" y="3608395"/>
+            <a:ext cx="2038772" cy="658001"/>
+          </a:xfrm>
+          <a:prstGeom prst="rect">
+            <a:avLst/>
+          </a:prstGeom>
+          <a:noFill/>
+        </p:spPr>
+        <p:txBody>
+          <a:bodyPr wrap="square" rtlCol="0">
+            <a:spAutoFit/>
+          </a:bodyPr>
+          <a:lstStyle/>
+          <a:p>
+            <a:r>
+              <a:rPr lang="en-GB" sz="3676" dirty="0"/>
+              <a:t>p</a:t>
+            </a:r>
+            <a:r>
+              <a:rPr lang="en-CH" sz="3676" dirty="0"/>
+              <a:t> = 0.031</a:t>
+            </a:r>
+          </a:p>
+        </p:txBody>
+      </p:sp>
+      <p:sp>
+        <p:nvSpPr>
+          <p:cNvPr id="30" name="Rounded Rectangle 29">
             <a:extLst>
               <a:ext uri="{FF2B5EF4-FFF2-40B4-BE49-F238E27FC236}">
-                <a16:creationId xmlns:a16="http://schemas.microsoft.com/office/drawing/2014/main" id="{26238EB9-71C2-6404-B722-5F63E8A2491B}"/>
+                <a16:creationId xmlns:a16="http://schemas.microsoft.com/office/drawing/2014/main" id="{B3AF2DD9-1F4A-4319-A4CB-273A74DF4FCF}"/>
               </a:ext>
             </a:extLst>
           </p:cNvPr>
-          <p:cNvGrpSpPr/>
+          <p:cNvSpPr/>
           <p:nvPr/>
-        </p:nvGrpSpPr>
-        <p:grpSpPr>
-          <a:xfrm>
-            <a:off x="9780442" y="6756158"/>
-            <a:ext cx="3529662" cy="2201181"/>
-            <a:chOff x="11037016" y="6241681"/>
-            <a:chExt cx="3529662" cy="2201181"/>
-          </a:xfrm>
-        </p:grpSpPr>
-        <p:sp>
-          <p:nvSpPr>
-            <p:cNvPr id="42" name="Rounded Rectangle 41">
-              <a:extLst>
-                <a:ext uri="{FF2B5EF4-FFF2-40B4-BE49-F238E27FC236}">
-                  <a16:creationId xmlns:a16="http://schemas.microsoft.com/office/drawing/2014/main" id="{C5A2046D-B8F4-E05D-AD2D-9AD61D6D6243}"/>
-                </a:ext>
-              </a:extLst>
-            </p:cNvPr>
-            <p:cNvSpPr/>
-            <p:nvPr/>
-          </p:nvSpPr>
-          <p:spPr>
-            <a:xfrm>
-              <a:off x="11037016" y="6241681"/>
-              <a:ext cx="3529662" cy="2108488"/>
-            </a:xfrm>
-            <a:prstGeom prst="roundRect">
-              <a:avLst/>
-            </a:prstGeom>
-            <a:noFill/>
-            <a:ln>
-              <a:solidFill>
-                <a:schemeClr val="accent1">
-                  <a:lumMod val="75000"/>
-                </a:schemeClr>
-              </a:solidFill>
-              <a:prstDash val="sysDot"/>
-            </a:ln>
-          </p:spPr>
-          <p:style>
-            <a:lnRef idx="2">
+        </p:nvSpPr>
+        <p:spPr>
+          <a:xfrm>
+            <a:off x="9831734" y="3513192"/>
+            <a:ext cx="3529654" cy="924406"/>
+          </a:xfrm>
+          <a:prstGeom prst="roundRect">
+            <a:avLst/>
+          </a:prstGeom>
+          <a:noFill/>
+          <a:ln w="25400">
+            <a:solidFill>
               <a:schemeClr val="accent1">
-                <a:shade val="15000"/>
+                <a:lumMod val="75000"/>
               </a:schemeClr>
-            </a:lnRef>
-            <a:fillRef idx="1">
-              <a:schemeClr val="accent1"/>
-            </a:fillRef>
-            <a:effectRef idx="0">
-              <a:schemeClr val="accent1"/>
-            </a:effectRef>
-            <a:fontRef idx="minor">
-              <a:schemeClr val="lt1"/>
-            </a:fontRef>
-          </p:style>
-          <p:txBody>
-            <a:bodyPr rtlCol="0" anchor="ctr"/>
-            <a:lstStyle/>
-            <a:p>
-              <a:pPr algn="ctr"/>
-              <a:endParaRPr lang="en-CH" sz="3676"/>
-            </a:p>
-          </p:txBody>
-        </p:sp>
-        <p:sp>
-          <p:nvSpPr>
-            <p:cNvPr id="40" name="Freeform 39">
-              <a:extLst>
-                <a:ext uri="{FF2B5EF4-FFF2-40B4-BE49-F238E27FC236}">
-                  <a16:creationId xmlns:a16="http://schemas.microsoft.com/office/drawing/2014/main" id="{0570837D-158F-69E5-4C42-88D3F6F25FE7}"/>
-                </a:ext>
-              </a:extLst>
-            </p:cNvPr>
-            <p:cNvSpPr/>
-            <p:nvPr/>
-          </p:nvSpPr>
-          <p:spPr>
-            <a:xfrm>
-              <a:off x="12764944" y="6568338"/>
-              <a:ext cx="1642726" cy="1306279"/>
-            </a:xfrm>
-            <a:custGeom>
-              <a:avLst/>
-              <a:gdLst>
-                <a:gd name="connsiteX0" fmla="*/ 0 w 9438290"/>
-                <a:gd name="connsiteY0" fmla="*/ 4056993 h 4067504"/>
-                <a:gd name="connsiteX1" fmla="*/ 2984938 w 9438290"/>
-                <a:gd name="connsiteY1" fmla="*/ 2984938 h 4067504"/>
-                <a:gd name="connsiteX2" fmla="*/ 4708635 w 9438290"/>
-                <a:gd name="connsiteY2" fmla="*/ 0 h 4067504"/>
-                <a:gd name="connsiteX3" fmla="*/ 6442842 w 9438290"/>
-                <a:gd name="connsiteY3" fmla="*/ 2995449 h 4067504"/>
-                <a:gd name="connsiteX4" fmla="*/ 9438290 w 9438290"/>
-                <a:gd name="connsiteY4" fmla="*/ 4067504 h 4067504"/>
-              </a:gdLst>
-              <a:ahLst/>
-              <a:cxnLst>
-                <a:cxn ang="0">
-                  <a:pos x="connsiteX0" y="connsiteY0"/>
-                </a:cxn>
-                <a:cxn ang="0">
-                  <a:pos x="connsiteX1" y="connsiteY1"/>
-                </a:cxn>
-                <a:cxn ang="0">
-                  <a:pos x="connsiteX2" y="connsiteY2"/>
-                </a:cxn>
-                <a:cxn ang="0">
-                  <a:pos x="connsiteX3" y="connsiteY3"/>
-                </a:cxn>
-                <a:cxn ang="0">
-                  <a:pos x="connsiteX4" y="connsiteY4"/>
-                </a:cxn>
-              </a:cxnLst>
-              <a:rect l="l" t="t" r="r" b="b"/>
-              <a:pathLst>
-                <a:path w="9438290" h="4067504">
-                  <a:moveTo>
-                    <a:pt x="0" y="4056993"/>
-                  </a:moveTo>
-                  <a:cubicBezTo>
-                    <a:pt x="1100083" y="3859048"/>
-                    <a:pt x="2200166" y="3661103"/>
-                    <a:pt x="2984938" y="2984938"/>
-                  </a:cubicBezTo>
-                  <a:cubicBezTo>
-                    <a:pt x="3769710" y="2308773"/>
-                    <a:pt x="4132318" y="-1752"/>
-                    <a:pt x="4708635" y="0"/>
-                  </a:cubicBezTo>
-                  <a:cubicBezTo>
-                    <a:pt x="5284952" y="1752"/>
-                    <a:pt x="5654566" y="2317532"/>
-                    <a:pt x="6442842" y="2995449"/>
-                  </a:cubicBezTo>
-                  <a:cubicBezTo>
-                    <a:pt x="7231118" y="3673366"/>
-                    <a:pt x="8334704" y="3870435"/>
-                    <a:pt x="9438290" y="4067504"/>
-                  </a:cubicBezTo>
-                </a:path>
-              </a:pathLst>
-            </a:custGeom>
-            <a:solidFill>
-              <a:srgbClr val="00B0F0"/>
             </a:solidFill>
-            <a:ln w="25400">
-              <a:noFill/>
-            </a:ln>
-          </p:spPr>
-          <p:style>
-            <a:lnRef idx="2">
-              <a:schemeClr val="accent1">
-                <a:shade val="15000"/>
-              </a:schemeClr>
-            </a:lnRef>
-            <a:fillRef idx="1">
-              <a:schemeClr val="accent1"/>
-            </a:fillRef>
-            <a:effectRef idx="0">
-              <a:schemeClr val="accent1"/>
-            </a:effectRef>
-            <a:fontRef idx="minor">
-              <a:schemeClr val="lt1"/>
-            </a:fontRef>
-          </p:style>
-          <p:txBody>
-            <a:bodyPr rtlCol="0" anchor="ctr"/>
-            <a:lstStyle/>
-            <a:p>
-              <a:pPr algn="ctr"/>
-              <a:endParaRPr lang="en-CH" sz="3676" dirty="0"/>
-            </a:p>
-          </p:txBody>
-        </p:sp>
-        <p:sp>
-          <p:nvSpPr>
-            <p:cNvPr id="31" name="TextBox 30">
-              <a:extLst>
-                <a:ext uri="{FF2B5EF4-FFF2-40B4-BE49-F238E27FC236}">
-                  <a16:creationId xmlns:a16="http://schemas.microsoft.com/office/drawing/2014/main" id="{BD844B68-C481-6168-0F95-177088CBE3E0}"/>
-                </a:ext>
-              </a:extLst>
-            </p:cNvPr>
-            <p:cNvSpPr txBox="1"/>
-            <p:nvPr/>
-          </p:nvSpPr>
-          <p:spPr>
-            <a:xfrm>
-              <a:off x="11229250" y="7738690"/>
-              <a:ext cx="499501" cy="658001"/>
-            </a:xfrm>
-            <a:prstGeom prst="rect">
-              <a:avLst/>
-            </a:prstGeom>
-            <a:noFill/>
-          </p:spPr>
-          <p:txBody>
-            <a:bodyPr wrap="square" rtlCol="0">
-              <a:spAutoFit/>
-            </a:bodyPr>
-            <a:lstStyle/>
-            <a:p>
-              <a:r>
-                <a:rPr lang="en-US" sz="3676" dirty="0"/>
-                <a:t>0</a:t>
-              </a:r>
-              <a:endParaRPr lang="en-CH" sz="3676" dirty="0"/>
-            </a:p>
-          </p:txBody>
-        </p:sp>
-        <p:sp>
-          <p:nvSpPr>
-            <p:cNvPr id="32" name="TextBox 31">
-              <a:extLst>
-                <a:ext uri="{FF2B5EF4-FFF2-40B4-BE49-F238E27FC236}">
-                  <a16:creationId xmlns:a16="http://schemas.microsoft.com/office/drawing/2014/main" id="{964F88DF-4829-75D7-579A-4EA0844070D8}"/>
-                </a:ext>
-              </a:extLst>
-            </p:cNvPr>
-            <p:cNvSpPr txBox="1"/>
-            <p:nvPr/>
-          </p:nvSpPr>
-          <p:spPr>
-            <a:xfrm>
-              <a:off x="14040442" y="7738690"/>
-              <a:ext cx="499501" cy="658001"/>
-            </a:xfrm>
-            <a:prstGeom prst="rect">
-              <a:avLst/>
-            </a:prstGeom>
-            <a:noFill/>
-          </p:spPr>
-          <p:txBody>
-            <a:bodyPr wrap="square" rtlCol="0">
-              <a:spAutoFit/>
-            </a:bodyPr>
-            <a:lstStyle/>
-            <a:p>
-              <a:r>
-                <a:rPr lang="en-US" sz="3676" dirty="0"/>
-                <a:t>1</a:t>
-              </a:r>
-              <a:endParaRPr lang="en-CH" sz="3676" dirty="0"/>
-            </a:p>
-          </p:txBody>
-        </p:sp>
-        <p:sp>
-          <p:nvSpPr>
-            <p:cNvPr id="34" name="TextBox 33">
-              <a:extLst>
-                <a:ext uri="{FF2B5EF4-FFF2-40B4-BE49-F238E27FC236}">
-                  <a16:creationId xmlns:a16="http://schemas.microsoft.com/office/drawing/2014/main" id="{B50F25C6-D89D-3C2F-5D2A-F5B354D28B80}"/>
-                </a:ext>
-              </a:extLst>
-            </p:cNvPr>
-            <p:cNvSpPr txBox="1"/>
-            <p:nvPr/>
-          </p:nvSpPr>
-          <p:spPr>
-            <a:xfrm>
-              <a:off x="12497135" y="7784861"/>
-              <a:ext cx="959043" cy="658001"/>
-            </a:xfrm>
-            <a:prstGeom prst="rect">
-              <a:avLst/>
-            </a:prstGeom>
-            <a:noFill/>
-          </p:spPr>
-          <p:txBody>
-            <a:bodyPr wrap="square" rtlCol="0">
-              <a:spAutoFit/>
-            </a:bodyPr>
-            <a:lstStyle/>
-            <a:p>
-              <a:r>
-                <a:rPr lang="en-US" sz="3676" dirty="0"/>
-                <a:t>0.5</a:t>
-              </a:r>
-              <a:endParaRPr lang="en-CH" sz="3676" dirty="0"/>
-            </a:p>
-          </p:txBody>
-        </p:sp>
-        <p:cxnSp>
-          <p:nvCxnSpPr>
-            <p:cNvPr id="37" name="Straight Connector 36">
-              <a:extLst>
-                <a:ext uri="{FF2B5EF4-FFF2-40B4-BE49-F238E27FC236}">
-                  <a16:creationId xmlns:a16="http://schemas.microsoft.com/office/drawing/2014/main" id="{0EEB9465-E760-36C8-B30B-80EE39CC326B}"/>
-                </a:ext>
-              </a:extLst>
-            </p:cNvPr>
-            <p:cNvCxnSpPr>
-              <a:cxnSpLocks/>
-            </p:cNvCxnSpPr>
-            <p:nvPr/>
-          </p:nvCxnSpPr>
-          <p:spPr>
-            <a:xfrm>
-              <a:off x="13145688" y="7843087"/>
-              <a:ext cx="915774" cy="0"/>
-            </a:xfrm>
-            <a:prstGeom prst="line">
-              <a:avLst/>
-            </a:prstGeom>
-            <a:ln w="63500">
-              <a:solidFill>
-                <a:schemeClr val="tx1"/>
-              </a:solidFill>
-            </a:ln>
-          </p:spPr>
-          <p:style>
-            <a:lnRef idx="1">
-              <a:schemeClr val="accent1"/>
-            </a:lnRef>
-            <a:fillRef idx="0">
-              <a:schemeClr val="accent1"/>
-            </a:fillRef>
-            <a:effectRef idx="0">
-              <a:schemeClr val="accent1"/>
-            </a:effectRef>
-            <a:fontRef idx="minor">
-              <a:schemeClr val="tx1"/>
-            </a:fontRef>
-          </p:style>
-        </p:cxnSp>
-        <p:sp>
-          <p:nvSpPr>
-            <p:cNvPr id="39" name="TextBox 38">
-              <a:extLst>
-                <a:ext uri="{FF2B5EF4-FFF2-40B4-BE49-F238E27FC236}">
-                  <a16:creationId xmlns:a16="http://schemas.microsoft.com/office/drawing/2014/main" id="{C1BE49C2-11AE-E3AD-8E32-B295B9DA7508}"/>
-                </a:ext>
-              </a:extLst>
-            </p:cNvPr>
-            <p:cNvSpPr txBox="1"/>
-            <p:nvPr/>
-          </p:nvSpPr>
-          <p:spPr>
-            <a:xfrm>
-              <a:off x="11116022" y="6322382"/>
-              <a:ext cx="1498350" cy="1015663"/>
-            </a:xfrm>
-            <a:prstGeom prst="rect">
-              <a:avLst/>
-            </a:prstGeom>
-            <a:noFill/>
-          </p:spPr>
-          <p:txBody>
-            <a:bodyPr wrap="square" rtlCol="0">
-              <a:spAutoFit/>
-            </a:bodyPr>
-            <a:lstStyle/>
-            <a:p>
-              <a:pPr algn="ctr"/>
-              <a:r>
-                <a:rPr lang="en-GB" sz="2000" dirty="0"/>
-                <a:t>Mode: 0.778 </a:t>
-              </a:r>
-            </a:p>
-            <a:p>
-              <a:pPr algn="ctr"/>
-              <a:r>
-                <a:rPr lang="en-GB" sz="2000" dirty="0"/>
-                <a:t>[95% HDI: 0.56, 0.92]</a:t>
-              </a:r>
-              <a:endParaRPr lang="en-CH" sz="2000" dirty="0"/>
-            </a:p>
-          </p:txBody>
-        </p:sp>
-        <p:cxnSp>
-          <p:nvCxnSpPr>
-            <p:cNvPr id="57" name="Straight Connector 56">
-              <a:extLst>
-                <a:ext uri="{FF2B5EF4-FFF2-40B4-BE49-F238E27FC236}">
-                  <a16:creationId xmlns:a16="http://schemas.microsoft.com/office/drawing/2014/main" id="{8A8D1DF8-F6BC-4A4F-577C-CBFAA8F7CDDA}"/>
-                </a:ext>
-              </a:extLst>
-            </p:cNvPr>
-            <p:cNvCxnSpPr>
-              <a:cxnSpLocks/>
-            </p:cNvCxnSpPr>
-            <p:nvPr/>
-          </p:nvCxnSpPr>
-          <p:spPr>
-            <a:xfrm>
-              <a:off x="11410192" y="7885723"/>
-              <a:ext cx="2880000" cy="0"/>
-            </a:xfrm>
-            <a:prstGeom prst="line">
-              <a:avLst/>
-            </a:prstGeom>
-            <a:ln w="25400">
-              <a:solidFill>
-                <a:schemeClr val="tx1"/>
-              </a:solidFill>
-            </a:ln>
-          </p:spPr>
-          <p:style>
-            <a:lnRef idx="1">
-              <a:schemeClr val="accent1"/>
-            </a:lnRef>
-            <a:fillRef idx="0">
-              <a:schemeClr val="accent1"/>
-            </a:fillRef>
-            <a:effectRef idx="0">
-              <a:schemeClr val="accent1"/>
-            </a:effectRef>
-            <a:fontRef idx="minor">
-              <a:schemeClr val="tx1"/>
-            </a:fontRef>
-          </p:style>
-        </p:cxnSp>
-      </p:grpSp>
-      <p:grpSp>
-        <p:nvGrpSpPr>
-          <p:cNvPr id="59" name="Group 58">
+            <a:prstDash val="sysDot"/>
+          </a:ln>
+        </p:spPr>
+        <p:style>
+          <a:lnRef idx="2">
+            <a:schemeClr val="accent1">
+              <a:shade val="15000"/>
+            </a:schemeClr>
+          </a:lnRef>
+          <a:fillRef idx="1">
+            <a:schemeClr val="accent1"/>
+          </a:fillRef>
+          <a:effectRef idx="0">
+            <a:schemeClr val="accent1"/>
+          </a:effectRef>
+          <a:fontRef idx="minor">
+            <a:schemeClr val="lt1"/>
+          </a:fontRef>
+        </p:style>
+        <p:txBody>
+          <a:bodyPr rtlCol="0" anchor="ctr"/>
+          <a:lstStyle/>
+          <a:p>
+            <a:pPr algn="ctr"/>
+            <a:endParaRPr lang="en-CH" sz="3676"/>
+          </a:p>
+        </p:txBody>
+      </p:sp>
+      <p:sp>
+        <p:nvSpPr>
+          <p:cNvPr id="13" name="TextBox 12">
             <a:extLst>
               <a:ext uri="{FF2B5EF4-FFF2-40B4-BE49-F238E27FC236}">
-                <a16:creationId xmlns:a16="http://schemas.microsoft.com/office/drawing/2014/main" id="{AB43F45B-C289-5436-C1D1-CBDE55AE5053}"/>
+                <a16:creationId xmlns:a16="http://schemas.microsoft.com/office/drawing/2014/main" id="{584E845F-AF38-FB52-48C1-DC9DFF08AB65}"/>
               </a:ext>
             </a:extLst>
           </p:cNvPr>
-          <p:cNvGrpSpPr/>
+          <p:cNvSpPr txBox="1"/>
           <p:nvPr/>
-        </p:nvGrpSpPr>
-        <p:grpSpPr>
+        </p:nvSpPr>
+        <p:spPr>
+          <a:xfrm>
+            <a:off x="10370312" y="3668314"/>
+            <a:ext cx="2580714" cy="658001"/>
+          </a:xfrm>
+          <a:prstGeom prst="rect">
+            <a:avLst/>
+          </a:prstGeom>
+          <a:noFill/>
+        </p:spPr>
+        <p:txBody>
+          <a:bodyPr wrap="square" rtlCol="0">
+            <a:spAutoFit/>
+          </a:bodyPr>
+          <a:lstStyle/>
+          <a:p>
+            <a:r>
+              <a:rPr lang="en-US" sz="3676" dirty="0" err="1"/>
+              <a:t>BF</a:t>
+            </a:r>
+            <a:r>
+              <a:rPr lang="en-US" sz="3676" baseline="-25000" dirty="0" err="1"/>
+              <a:t>null</a:t>
+            </a:r>
+            <a:r>
+              <a:rPr lang="en-US" sz="3676" dirty="0"/>
+              <a:t> = 0.22</a:t>
+            </a:r>
+            <a:endParaRPr lang="en-CH" sz="3676" dirty="0"/>
+          </a:p>
+        </p:txBody>
+      </p:sp>
+      <p:sp>
+        <p:nvSpPr>
+          <p:cNvPr id="42" name="Rounded Rectangle 41">
+            <a:extLst>
+              <a:ext uri="{FF2B5EF4-FFF2-40B4-BE49-F238E27FC236}">
+                <a16:creationId xmlns:a16="http://schemas.microsoft.com/office/drawing/2014/main" id="{C5A2046D-B8F4-E05D-AD2D-9AD61D6D6243}"/>
+              </a:ext>
+            </a:extLst>
+          </p:cNvPr>
+          <p:cNvSpPr/>
+          <p:nvPr/>
+        </p:nvSpPr>
+        <p:spPr>
+          <a:xfrm>
+            <a:off x="9780442" y="6756158"/>
+            <a:ext cx="3529662" cy="2108488"/>
+          </a:xfrm>
+          <a:prstGeom prst="roundRect">
+            <a:avLst/>
+          </a:prstGeom>
+          <a:noFill/>
+          <a:ln w="25400">
+            <a:solidFill>
+              <a:schemeClr val="accent1">
+                <a:lumMod val="75000"/>
+              </a:schemeClr>
+            </a:solidFill>
+            <a:prstDash val="sysDot"/>
+          </a:ln>
+        </p:spPr>
+        <p:style>
+          <a:lnRef idx="2">
+            <a:schemeClr val="accent1">
+              <a:shade val="15000"/>
+            </a:schemeClr>
+          </a:lnRef>
+          <a:fillRef idx="1">
+            <a:schemeClr val="accent1"/>
+          </a:fillRef>
+          <a:effectRef idx="0">
+            <a:schemeClr val="accent1"/>
+          </a:effectRef>
+          <a:fontRef idx="minor">
+            <a:schemeClr val="lt1"/>
+          </a:fontRef>
+        </p:style>
+        <p:txBody>
+          <a:bodyPr rtlCol="0" anchor="ctr"/>
+          <a:lstStyle/>
+          <a:p>
+            <a:pPr algn="ctr"/>
+            <a:endParaRPr lang="en-CH" sz="3676"/>
+          </a:p>
+        </p:txBody>
+      </p:sp>
+      <p:sp>
+        <p:nvSpPr>
+          <p:cNvPr id="40" name="Freeform 39">
+            <a:extLst>
+              <a:ext uri="{FF2B5EF4-FFF2-40B4-BE49-F238E27FC236}">
+                <a16:creationId xmlns:a16="http://schemas.microsoft.com/office/drawing/2014/main" id="{0570837D-158F-69E5-4C42-88D3F6F25FE7}"/>
+              </a:ext>
+            </a:extLst>
+          </p:cNvPr>
+          <p:cNvSpPr/>
+          <p:nvPr/>
+        </p:nvSpPr>
+        <p:spPr>
+          <a:xfrm>
+            <a:off x="11508370" y="7061795"/>
+            <a:ext cx="1642726" cy="1306279"/>
+          </a:xfrm>
+          <a:custGeom>
+            <a:avLst/>
+            <a:gdLst>
+              <a:gd name="connsiteX0" fmla="*/ 0 w 9438290"/>
+              <a:gd name="connsiteY0" fmla="*/ 4056993 h 4067504"/>
+              <a:gd name="connsiteX1" fmla="*/ 2984938 w 9438290"/>
+              <a:gd name="connsiteY1" fmla="*/ 2984938 h 4067504"/>
+              <a:gd name="connsiteX2" fmla="*/ 4708635 w 9438290"/>
+              <a:gd name="connsiteY2" fmla="*/ 0 h 4067504"/>
+              <a:gd name="connsiteX3" fmla="*/ 6442842 w 9438290"/>
+              <a:gd name="connsiteY3" fmla="*/ 2995449 h 4067504"/>
+              <a:gd name="connsiteX4" fmla="*/ 9438290 w 9438290"/>
+              <a:gd name="connsiteY4" fmla="*/ 4067504 h 4067504"/>
+            </a:gdLst>
+            <a:ahLst/>
+            <a:cxnLst>
+              <a:cxn ang="0">
+                <a:pos x="connsiteX0" y="connsiteY0"/>
+              </a:cxn>
+              <a:cxn ang="0">
+                <a:pos x="connsiteX1" y="connsiteY1"/>
+              </a:cxn>
+              <a:cxn ang="0">
+                <a:pos x="connsiteX2" y="connsiteY2"/>
+              </a:cxn>
+              <a:cxn ang="0">
+                <a:pos x="connsiteX3" y="connsiteY3"/>
+              </a:cxn>
+              <a:cxn ang="0">
+                <a:pos x="connsiteX4" y="connsiteY4"/>
+              </a:cxn>
+            </a:cxnLst>
+            <a:rect l="l" t="t" r="r" b="b"/>
+            <a:pathLst>
+              <a:path w="9438290" h="4067504">
+                <a:moveTo>
+                  <a:pt x="0" y="4056993"/>
+                </a:moveTo>
+                <a:cubicBezTo>
+                  <a:pt x="1100083" y="3859048"/>
+                  <a:pt x="2200166" y="3661103"/>
+                  <a:pt x="2984938" y="2984938"/>
+                </a:cubicBezTo>
+                <a:cubicBezTo>
+                  <a:pt x="3769710" y="2308773"/>
+                  <a:pt x="4132318" y="-1752"/>
+                  <a:pt x="4708635" y="0"/>
+                </a:cubicBezTo>
+                <a:cubicBezTo>
+                  <a:pt x="5284952" y="1752"/>
+                  <a:pt x="5654566" y="2317532"/>
+                  <a:pt x="6442842" y="2995449"/>
+                </a:cubicBezTo>
+                <a:cubicBezTo>
+                  <a:pt x="7231118" y="3673366"/>
+                  <a:pt x="8334704" y="3870435"/>
+                  <a:pt x="9438290" y="4067504"/>
+                </a:cubicBezTo>
+              </a:path>
+            </a:pathLst>
+          </a:custGeom>
+          <a:solidFill>
+            <a:srgbClr val="00B0F0"/>
+          </a:solidFill>
+          <a:ln w="25400">
+            <a:noFill/>
+          </a:ln>
+        </p:spPr>
+        <p:style>
+          <a:lnRef idx="2">
+            <a:schemeClr val="accent1">
+              <a:shade val="15000"/>
+            </a:schemeClr>
+          </a:lnRef>
+          <a:fillRef idx="1">
+            <a:schemeClr val="accent1"/>
+          </a:fillRef>
+          <a:effectRef idx="0">
+            <a:schemeClr val="accent1"/>
+          </a:effectRef>
+          <a:fontRef idx="minor">
+            <a:schemeClr val="lt1"/>
+          </a:fontRef>
+        </p:style>
+        <p:txBody>
+          <a:bodyPr rtlCol="0" anchor="ctr"/>
+          <a:lstStyle/>
+          <a:p>
+            <a:pPr algn="ctr"/>
+            <a:endParaRPr lang="en-CH" sz="3676" dirty="0"/>
+          </a:p>
+        </p:txBody>
+      </p:sp>
+      <p:sp>
+        <p:nvSpPr>
+          <p:cNvPr id="31" name="TextBox 30">
+            <a:extLst>
+              <a:ext uri="{FF2B5EF4-FFF2-40B4-BE49-F238E27FC236}">
+                <a16:creationId xmlns:a16="http://schemas.microsoft.com/office/drawing/2014/main" id="{BD844B68-C481-6168-0F95-177088CBE3E0}"/>
+              </a:ext>
+            </a:extLst>
+          </p:cNvPr>
+          <p:cNvSpPr txBox="1"/>
+          <p:nvPr/>
+        </p:nvSpPr>
+        <p:spPr>
+          <a:xfrm>
+            <a:off x="10025226" y="8305717"/>
+            <a:ext cx="499501" cy="477054"/>
+          </a:xfrm>
+          <a:prstGeom prst="rect">
+            <a:avLst/>
+          </a:prstGeom>
+          <a:noFill/>
+        </p:spPr>
+        <p:txBody>
+          <a:bodyPr wrap="square" rtlCol="0">
+            <a:spAutoFit/>
+          </a:bodyPr>
+          <a:lstStyle/>
+          <a:p>
+            <a:r>
+              <a:rPr lang="en-US" sz="2500" dirty="0"/>
+              <a:t>0</a:t>
+            </a:r>
+            <a:endParaRPr lang="en-CH" sz="2500" dirty="0"/>
+          </a:p>
+        </p:txBody>
+      </p:sp>
+      <p:sp>
+        <p:nvSpPr>
+          <p:cNvPr id="32" name="TextBox 31">
+            <a:extLst>
+              <a:ext uri="{FF2B5EF4-FFF2-40B4-BE49-F238E27FC236}">
+                <a16:creationId xmlns:a16="http://schemas.microsoft.com/office/drawing/2014/main" id="{964F88DF-4829-75D7-579A-4EA0844070D8}"/>
+              </a:ext>
+            </a:extLst>
+          </p:cNvPr>
+          <p:cNvSpPr txBox="1"/>
+          <p:nvPr/>
+        </p:nvSpPr>
+        <p:spPr>
+          <a:xfrm>
+            <a:off x="12836418" y="8305717"/>
+            <a:ext cx="499501" cy="477054"/>
+          </a:xfrm>
+          <a:prstGeom prst="rect">
+            <a:avLst/>
+          </a:prstGeom>
+          <a:noFill/>
+        </p:spPr>
+        <p:txBody>
+          <a:bodyPr wrap="square" rtlCol="0">
+            <a:spAutoFit/>
+          </a:bodyPr>
+          <a:lstStyle/>
+          <a:p>
+            <a:r>
+              <a:rPr lang="en-US" sz="2500" dirty="0"/>
+              <a:t>1</a:t>
+            </a:r>
+            <a:endParaRPr lang="en-CH" sz="2500" dirty="0"/>
+          </a:p>
+        </p:txBody>
+      </p:sp>
+      <p:sp>
+        <p:nvSpPr>
+          <p:cNvPr id="34" name="TextBox 33">
+            <a:extLst>
+              <a:ext uri="{FF2B5EF4-FFF2-40B4-BE49-F238E27FC236}">
+                <a16:creationId xmlns:a16="http://schemas.microsoft.com/office/drawing/2014/main" id="{B50F25C6-D89D-3C2F-5D2A-F5B354D28B80}"/>
+              </a:ext>
+            </a:extLst>
+          </p:cNvPr>
+          <p:cNvSpPr txBox="1"/>
+          <p:nvPr/>
+        </p:nvSpPr>
+        <p:spPr>
+          <a:xfrm>
+            <a:off x="11293111" y="8351888"/>
+            <a:ext cx="959043" cy="477054"/>
+          </a:xfrm>
+          <a:prstGeom prst="rect">
+            <a:avLst/>
+          </a:prstGeom>
+          <a:noFill/>
+        </p:spPr>
+        <p:txBody>
+          <a:bodyPr wrap="square" rtlCol="0">
+            <a:spAutoFit/>
+          </a:bodyPr>
+          <a:lstStyle/>
+          <a:p>
+            <a:r>
+              <a:rPr lang="en-US" sz="2500" dirty="0"/>
+              <a:t>0.5</a:t>
+            </a:r>
+            <a:endParaRPr lang="en-CH" sz="2500" dirty="0"/>
+          </a:p>
+        </p:txBody>
+      </p:sp>
+      <p:sp>
+        <p:nvSpPr>
+          <p:cNvPr id="39" name="TextBox 38">
+            <a:extLst>
+              <a:ext uri="{FF2B5EF4-FFF2-40B4-BE49-F238E27FC236}">
+                <a16:creationId xmlns:a16="http://schemas.microsoft.com/office/drawing/2014/main" id="{C1BE49C2-11AE-E3AD-8E32-B295B9DA7508}"/>
+              </a:ext>
+            </a:extLst>
+          </p:cNvPr>
+          <p:cNvSpPr txBox="1"/>
+          <p:nvPr/>
+        </p:nvSpPr>
+        <p:spPr>
+          <a:xfrm>
+            <a:off x="9859447" y="6836859"/>
+            <a:ext cx="1982831" cy="1246495"/>
+          </a:xfrm>
+          <a:prstGeom prst="rect">
+            <a:avLst/>
+          </a:prstGeom>
+          <a:noFill/>
+        </p:spPr>
+        <p:txBody>
+          <a:bodyPr wrap="square" rtlCol="0">
+            <a:spAutoFit/>
+          </a:bodyPr>
+          <a:lstStyle/>
+          <a:p>
+            <a:pPr algn="ctr"/>
+            <a:r>
+              <a:rPr lang="en-GB" sz="2500" dirty="0"/>
+              <a:t>Mode: 0.778 </a:t>
+            </a:r>
+          </a:p>
+          <a:p>
+            <a:pPr algn="ctr"/>
+            <a:r>
+              <a:rPr lang="en-GB" sz="2500" dirty="0"/>
+              <a:t>[95% HDI: 0.56, 0.92]</a:t>
+            </a:r>
+            <a:endParaRPr lang="en-CH" sz="2500" dirty="0"/>
+          </a:p>
+        </p:txBody>
+      </p:sp>
+      <p:cxnSp>
+        <p:nvCxnSpPr>
+          <p:cNvPr id="57" name="Straight Connector 56">
+            <a:extLst>
+              <a:ext uri="{FF2B5EF4-FFF2-40B4-BE49-F238E27FC236}">
+                <a16:creationId xmlns:a16="http://schemas.microsoft.com/office/drawing/2014/main" id="{8A8D1DF8-F6BC-4A4F-577C-CBFAA8F7CDDA}"/>
+              </a:ext>
+            </a:extLst>
+          </p:cNvPr>
+          <p:cNvCxnSpPr>
+            <a:cxnSpLocks/>
+          </p:cNvCxnSpPr>
+          <p:nvPr/>
+        </p:nvCxnSpPr>
+        <p:spPr>
+          <a:xfrm>
+            <a:off x="10153618" y="8400200"/>
+            <a:ext cx="2880000" cy="0"/>
+          </a:xfrm>
+          <a:prstGeom prst="line">
+            <a:avLst/>
+          </a:prstGeom>
+          <a:ln w="25400">
+            <a:solidFill>
+              <a:schemeClr val="tx1"/>
+            </a:solidFill>
+          </a:ln>
+        </p:spPr>
+        <p:style>
+          <a:lnRef idx="1">
+            <a:schemeClr val="accent1"/>
+          </a:lnRef>
+          <a:fillRef idx="0">
+            <a:schemeClr val="accent1"/>
+          </a:fillRef>
+          <a:effectRef idx="0">
+            <a:schemeClr val="accent1"/>
+          </a:effectRef>
+          <a:fontRef idx="minor">
+            <a:schemeClr val="tx1"/>
+          </a:fontRef>
+        </p:style>
+      </p:cxnSp>
+      <p:sp>
+        <p:nvSpPr>
+          <p:cNvPr id="60" name="Rounded Rectangle 59">
+            <a:extLst>
+              <a:ext uri="{FF2B5EF4-FFF2-40B4-BE49-F238E27FC236}">
+                <a16:creationId xmlns:a16="http://schemas.microsoft.com/office/drawing/2014/main" id="{69F4C6D7-1164-C4F5-915F-5DAC3F6BDDDD}"/>
+              </a:ext>
+            </a:extLst>
+          </p:cNvPr>
+          <p:cNvSpPr/>
+          <p:nvPr/>
+        </p:nvSpPr>
+        <p:spPr>
           <a:xfrm>
             <a:off x="4671735" y="6756158"/>
-            <a:ext cx="3529662" cy="2201181"/>
-            <a:chOff x="11037016" y="6241681"/>
-            <a:chExt cx="3529662" cy="2201181"/>
-          </a:xfrm>
-        </p:grpSpPr>
-        <p:sp>
-          <p:nvSpPr>
-            <p:cNvPr id="60" name="Rounded Rectangle 59">
-              <a:extLst>
-                <a:ext uri="{FF2B5EF4-FFF2-40B4-BE49-F238E27FC236}">
-                  <a16:creationId xmlns:a16="http://schemas.microsoft.com/office/drawing/2014/main" id="{69F4C6D7-1164-C4F5-915F-5DAC3F6BDDDD}"/>
-                </a:ext>
-              </a:extLst>
-            </p:cNvPr>
-            <p:cNvSpPr/>
-            <p:nvPr/>
-          </p:nvSpPr>
-          <p:spPr>
-            <a:xfrm>
-              <a:off x="11037016" y="6241681"/>
-              <a:ext cx="3529662" cy="2108488"/>
-            </a:xfrm>
-            <a:prstGeom prst="roundRect">
-              <a:avLst/>
-            </a:prstGeom>
-            <a:noFill/>
-            <a:ln>
-              <a:solidFill>
-                <a:schemeClr val="accent1">
-                  <a:lumMod val="75000"/>
-                </a:schemeClr>
-              </a:solidFill>
-              <a:prstDash val="sysDot"/>
-            </a:ln>
-          </p:spPr>
-          <p:style>
-            <a:lnRef idx="2">
+            <a:ext cx="3529662" cy="2108488"/>
+          </a:xfrm>
+          <a:prstGeom prst="roundRect">
+            <a:avLst/>
+          </a:prstGeom>
+          <a:noFill/>
+          <a:ln w="25400">
+            <a:solidFill>
               <a:schemeClr val="accent1">
-                <a:shade val="15000"/>
+                <a:lumMod val="75000"/>
               </a:schemeClr>
-            </a:lnRef>
-            <a:fillRef idx="1">
-              <a:schemeClr val="accent1"/>
-            </a:fillRef>
-            <a:effectRef idx="0">
-              <a:schemeClr val="accent1"/>
-            </a:effectRef>
-            <a:fontRef idx="minor">
-              <a:schemeClr val="lt1"/>
-            </a:fontRef>
-          </p:style>
-          <p:txBody>
-            <a:bodyPr rtlCol="0" anchor="ctr"/>
-            <a:lstStyle/>
-            <a:p>
-              <a:pPr algn="ctr"/>
-              <a:endParaRPr lang="en-CH" sz="3676"/>
-            </a:p>
-          </p:txBody>
-        </p:sp>
-        <p:sp>
-          <p:nvSpPr>
-            <p:cNvPr id="62" name="TextBox 61">
-              <a:extLst>
-                <a:ext uri="{FF2B5EF4-FFF2-40B4-BE49-F238E27FC236}">
-                  <a16:creationId xmlns:a16="http://schemas.microsoft.com/office/drawing/2014/main" id="{D1693A04-9457-6D46-4B2F-FEDD7485A781}"/>
-                </a:ext>
-              </a:extLst>
-            </p:cNvPr>
-            <p:cNvSpPr txBox="1"/>
-            <p:nvPr/>
-          </p:nvSpPr>
-          <p:spPr>
-            <a:xfrm>
-              <a:off x="11229250" y="7738690"/>
-              <a:ext cx="499501" cy="658001"/>
-            </a:xfrm>
-            <a:prstGeom prst="rect">
-              <a:avLst/>
-            </a:prstGeom>
-            <a:noFill/>
-          </p:spPr>
-          <p:txBody>
-            <a:bodyPr wrap="square" rtlCol="0">
-              <a:spAutoFit/>
-            </a:bodyPr>
-            <a:lstStyle/>
-            <a:p>
-              <a:r>
-                <a:rPr lang="en-US" sz="3676" dirty="0"/>
-                <a:t>0</a:t>
-              </a:r>
-              <a:endParaRPr lang="en-CH" sz="3676" dirty="0"/>
-            </a:p>
-          </p:txBody>
-        </p:sp>
-        <p:sp>
-          <p:nvSpPr>
-            <p:cNvPr id="63" name="TextBox 62">
-              <a:extLst>
-                <a:ext uri="{FF2B5EF4-FFF2-40B4-BE49-F238E27FC236}">
-                  <a16:creationId xmlns:a16="http://schemas.microsoft.com/office/drawing/2014/main" id="{1784CDE8-FF9B-A287-8581-14FFE3F09B7B}"/>
-                </a:ext>
-              </a:extLst>
-            </p:cNvPr>
-            <p:cNvSpPr txBox="1"/>
-            <p:nvPr/>
-          </p:nvSpPr>
-          <p:spPr>
-            <a:xfrm>
-              <a:off x="14040442" y="7738690"/>
-              <a:ext cx="499501" cy="658001"/>
-            </a:xfrm>
-            <a:prstGeom prst="rect">
-              <a:avLst/>
-            </a:prstGeom>
-            <a:noFill/>
-          </p:spPr>
-          <p:txBody>
-            <a:bodyPr wrap="square" rtlCol="0">
-              <a:spAutoFit/>
-            </a:bodyPr>
-            <a:lstStyle/>
-            <a:p>
-              <a:r>
-                <a:rPr lang="en-US" sz="3676" dirty="0"/>
-                <a:t>1</a:t>
-              </a:r>
-              <a:endParaRPr lang="en-CH" sz="3676" dirty="0"/>
-            </a:p>
-          </p:txBody>
-        </p:sp>
-        <p:sp>
-          <p:nvSpPr>
-            <p:cNvPr id="64" name="TextBox 63">
-              <a:extLst>
-                <a:ext uri="{FF2B5EF4-FFF2-40B4-BE49-F238E27FC236}">
-                  <a16:creationId xmlns:a16="http://schemas.microsoft.com/office/drawing/2014/main" id="{F8044814-A77E-E92B-C3A1-789D7AA6EB56}"/>
-                </a:ext>
-              </a:extLst>
-            </p:cNvPr>
-            <p:cNvSpPr txBox="1"/>
-            <p:nvPr/>
-          </p:nvSpPr>
-          <p:spPr>
-            <a:xfrm>
-              <a:off x="12497135" y="7784861"/>
-              <a:ext cx="959043" cy="658001"/>
-            </a:xfrm>
-            <a:prstGeom prst="rect">
-              <a:avLst/>
-            </a:prstGeom>
-            <a:noFill/>
-          </p:spPr>
-          <p:txBody>
-            <a:bodyPr wrap="square" rtlCol="0">
-              <a:spAutoFit/>
-            </a:bodyPr>
-            <a:lstStyle/>
-            <a:p>
-              <a:r>
-                <a:rPr lang="en-US" sz="3676" dirty="0"/>
-                <a:t>0.5</a:t>
-              </a:r>
-              <a:endParaRPr lang="en-CH" sz="3676" dirty="0"/>
-            </a:p>
-          </p:txBody>
-        </p:sp>
-        <p:cxnSp>
-          <p:nvCxnSpPr>
-            <p:cNvPr id="65" name="Straight Connector 64">
-              <a:extLst>
-                <a:ext uri="{FF2B5EF4-FFF2-40B4-BE49-F238E27FC236}">
-                  <a16:creationId xmlns:a16="http://schemas.microsoft.com/office/drawing/2014/main" id="{364DA72F-75E5-CD04-1EA1-76A2309C19D0}"/>
-                </a:ext>
-              </a:extLst>
-            </p:cNvPr>
-            <p:cNvCxnSpPr>
-              <a:cxnSpLocks/>
-            </p:cNvCxnSpPr>
-            <p:nvPr/>
-          </p:nvCxnSpPr>
-          <p:spPr>
-            <a:xfrm>
-              <a:off x="13145688" y="7843087"/>
-              <a:ext cx="915774" cy="0"/>
-            </a:xfrm>
-            <a:prstGeom prst="line">
-              <a:avLst/>
-            </a:prstGeom>
-            <a:ln w="63500">
-              <a:solidFill>
-                <a:schemeClr val="tx1"/>
-              </a:solidFill>
-            </a:ln>
-          </p:spPr>
-          <p:style>
-            <a:lnRef idx="1">
-              <a:schemeClr val="accent1"/>
-            </a:lnRef>
-            <a:fillRef idx="0">
-              <a:schemeClr val="accent1"/>
-            </a:fillRef>
-            <a:effectRef idx="0">
-              <a:schemeClr val="accent1"/>
-            </a:effectRef>
-            <a:fontRef idx="minor">
+            </a:solidFill>
+            <a:prstDash val="sysDot"/>
+          </a:ln>
+        </p:spPr>
+        <p:style>
+          <a:lnRef idx="2">
+            <a:schemeClr val="accent1">
+              <a:shade val="15000"/>
+            </a:schemeClr>
+          </a:lnRef>
+          <a:fillRef idx="1">
+            <a:schemeClr val="accent1"/>
+          </a:fillRef>
+          <a:effectRef idx="0">
+            <a:schemeClr val="accent1"/>
+          </a:effectRef>
+          <a:fontRef idx="minor">
+            <a:schemeClr val="lt1"/>
+          </a:fontRef>
+        </p:style>
+        <p:txBody>
+          <a:bodyPr rtlCol="0" anchor="ctr"/>
+          <a:lstStyle/>
+          <a:p>
+            <a:pPr algn="ctr"/>
+            <a:endParaRPr lang="en-CH" sz="3676"/>
+          </a:p>
+        </p:txBody>
+      </p:sp>
+      <p:sp>
+        <p:nvSpPr>
+          <p:cNvPr id="62" name="TextBox 61">
+            <a:extLst>
+              <a:ext uri="{FF2B5EF4-FFF2-40B4-BE49-F238E27FC236}">
+                <a16:creationId xmlns:a16="http://schemas.microsoft.com/office/drawing/2014/main" id="{D1693A04-9457-6D46-4B2F-FEDD7485A781}"/>
+              </a:ext>
+            </a:extLst>
+          </p:cNvPr>
+          <p:cNvSpPr txBox="1"/>
+          <p:nvPr/>
+        </p:nvSpPr>
+        <p:spPr>
+          <a:xfrm>
+            <a:off x="4916519" y="8326737"/>
+            <a:ext cx="499501" cy="477054"/>
+          </a:xfrm>
+          <a:prstGeom prst="rect">
+            <a:avLst/>
+          </a:prstGeom>
+          <a:noFill/>
+        </p:spPr>
+        <p:txBody>
+          <a:bodyPr wrap="square" rtlCol="0">
+            <a:spAutoFit/>
+          </a:bodyPr>
+          <a:lstStyle/>
+          <a:p>
+            <a:r>
+              <a:rPr lang="en-US" sz="2500" dirty="0"/>
+              <a:t>0</a:t>
+            </a:r>
+            <a:endParaRPr lang="en-CH" sz="2500" dirty="0"/>
+          </a:p>
+        </p:txBody>
+      </p:sp>
+      <p:sp>
+        <p:nvSpPr>
+          <p:cNvPr id="63" name="TextBox 62">
+            <a:extLst>
+              <a:ext uri="{FF2B5EF4-FFF2-40B4-BE49-F238E27FC236}">
+                <a16:creationId xmlns:a16="http://schemas.microsoft.com/office/drawing/2014/main" id="{1784CDE8-FF9B-A287-8581-14FFE3F09B7B}"/>
+              </a:ext>
+            </a:extLst>
+          </p:cNvPr>
+          <p:cNvSpPr txBox="1"/>
+          <p:nvPr/>
+        </p:nvSpPr>
+        <p:spPr>
+          <a:xfrm>
+            <a:off x="7727711" y="8326737"/>
+            <a:ext cx="499501" cy="477054"/>
+          </a:xfrm>
+          <a:prstGeom prst="rect">
+            <a:avLst/>
+          </a:prstGeom>
+          <a:noFill/>
+        </p:spPr>
+        <p:txBody>
+          <a:bodyPr wrap="square" rtlCol="0">
+            <a:spAutoFit/>
+          </a:bodyPr>
+          <a:lstStyle/>
+          <a:p>
+            <a:r>
+              <a:rPr lang="en-US" sz="2500" dirty="0"/>
+              <a:t>1</a:t>
+            </a:r>
+            <a:endParaRPr lang="en-CH" sz="2500" dirty="0"/>
+          </a:p>
+        </p:txBody>
+      </p:sp>
+      <p:sp>
+        <p:nvSpPr>
+          <p:cNvPr id="64" name="TextBox 63">
+            <a:extLst>
+              <a:ext uri="{FF2B5EF4-FFF2-40B4-BE49-F238E27FC236}">
+                <a16:creationId xmlns:a16="http://schemas.microsoft.com/office/drawing/2014/main" id="{F8044814-A77E-E92B-C3A1-789D7AA6EB56}"/>
+              </a:ext>
+            </a:extLst>
+          </p:cNvPr>
+          <p:cNvSpPr txBox="1"/>
+          <p:nvPr/>
+        </p:nvSpPr>
+        <p:spPr>
+          <a:xfrm>
+            <a:off x="6184404" y="8351888"/>
+            <a:ext cx="959043" cy="477054"/>
+          </a:xfrm>
+          <a:prstGeom prst="rect">
+            <a:avLst/>
+          </a:prstGeom>
+          <a:noFill/>
+        </p:spPr>
+        <p:txBody>
+          <a:bodyPr wrap="square" rtlCol="0">
+            <a:spAutoFit/>
+          </a:bodyPr>
+          <a:lstStyle/>
+          <a:p>
+            <a:r>
+              <a:rPr lang="en-US" sz="2500" dirty="0"/>
+              <a:t>0.5</a:t>
+            </a:r>
+            <a:endParaRPr lang="en-CH" sz="2500" dirty="0"/>
+          </a:p>
+        </p:txBody>
+      </p:sp>
+      <p:cxnSp>
+        <p:nvCxnSpPr>
+          <p:cNvPr id="65" name="Straight Connector 64">
+            <a:extLst>
+              <a:ext uri="{FF2B5EF4-FFF2-40B4-BE49-F238E27FC236}">
+                <a16:creationId xmlns:a16="http://schemas.microsoft.com/office/drawing/2014/main" id="{364DA72F-75E5-CD04-1EA1-76A2309C19D0}"/>
+              </a:ext>
+            </a:extLst>
+          </p:cNvPr>
+          <p:cNvCxnSpPr>
+            <a:cxnSpLocks/>
+          </p:cNvCxnSpPr>
+          <p:nvPr/>
+        </p:nvCxnSpPr>
+        <p:spPr>
+          <a:xfrm>
+            <a:off x="6780407" y="8305014"/>
+            <a:ext cx="915774" cy="0"/>
+          </a:xfrm>
+          <a:prstGeom prst="line">
+            <a:avLst/>
+          </a:prstGeom>
+          <a:ln w="127000">
+            <a:solidFill>
               <a:schemeClr val="tx1"/>
-            </a:fontRef>
-          </p:style>
-        </p:cxnSp>
-        <p:sp>
-          <p:nvSpPr>
-            <p:cNvPr id="66" name="TextBox 65">
-              <a:extLst>
-                <a:ext uri="{FF2B5EF4-FFF2-40B4-BE49-F238E27FC236}">
-                  <a16:creationId xmlns:a16="http://schemas.microsoft.com/office/drawing/2014/main" id="{03C6C45F-B741-14BC-4FCA-88FAF3DFA9DD}"/>
-                </a:ext>
-              </a:extLst>
-            </p:cNvPr>
-            <p:cNvSpPr txBox="1"/>
-            <p:nvPr/>
-          </p:nvSpPr>
-          <p:spPr>
-            <a:xfrm>
-              <a:off x="11072346" y="6307185"/>
-              <a:ext cx="1424789" cy="1015663"/>
-            </a:xfrm>
-            <a:prstGeom prst="rect">
-              <a:avLst/>
-            </a:prstGeom>
-            <a:noFill/>
-          </p:spPr>
-          <p:txBody>
-            <a:bodyPr wrap="square" rtlCol="0">
-              <a:spAutoFit/>
-            </a:bodyPr>
-            <a:lstStyle/>
-            <a:p>
-              <a:pPr algn="ctr"/>
-              <a:r>
-                <a:rPr lang="en-GB" sz="2000" dirty="0"/>
-                <a:t>MLE: 0.778 </a:t>
-              </a:r>
-            </a:p>
-            <a:p>
-              <a:pPr algn="ctr"/>
-              <a:r>
-                <a:rPr lang="en-GB" sz="2000" dirty="0"/>
-                <a:t>[95% CI: 0.53, 0.92]</a:t>
-              </a:r>
-              <a:endParaRPr lang="en-CH" sz="2000" dirty="0"/>
-            </a:p>
-          </p:txBody>
-        </p:sp>
-        <p:cxnSp>
-          <p:nvCxnSpPr>
-            <p:cNvPr id="67" name="Straight Connector 66">
-              <a:extLst>
-                <a:ext uri="{FF2B5EF4-FFF2-40B4-BE49-F238E27FC236}">
-                  <a16:creationId xmlns:a16="http://schemas.microsoft.com/office/drawing/2014/main" id="{EF7F93C8-A5CD-61B0-CA3E-89C9A72D79A8}"/>
-                </a:ext>
-              </a:extLst>
-            </p:cNvPr>
-            <p:cNvCxnSpPr>
-              <a:cxnSpLocks/>
-            </p:cNvCxnSpPr>
-            <p:nvPr/>
-          </p:nvCxnSpPr>
-          <p:spPr>
-            <a:xfrm>
-              <a:off x="11410192" y="7885723"/>
-              <a:ext cx="2880000" cy="0"/>
-            </a:xfrm>
-            <a:prstGeom prst="line">
-              <a:avLst/>
-            </a:prstGeom>
-            <a:ln w="25400">
-              <a:solidFill>
-                <a:schemeClr val="tx1"/>
-              </a:solidFill>
-            </a:ln>
-          </p:spPr>
-          <p:style>
-            <a:lnRef idx="1">
-              <a:schemeClr val="accent1"/>
-            </a:lnRef>
-            <a:fillRef idx="0">
-              <a:schemeClr val="accent1"/>
-            </a:fillRef>
-            <a:effectRef idx="0">
-              <a:schemeClr val="accent1"/>
-            </a:effectRef>
-            <a:fontRef idx="minor">
+            </a:solidFill>
+          </a:ln>
+        </p:spPr>
+        <p:style>
+          <a:lnRef idx="1">
+            <a:schemeClr val="accent1"/>
+          </a:lnRef>
+          <a:fillRef idx="0">
+            <a:schemeClr val="accent1"/>
+          </a:fillRef>
+          <a:effectRef idx="0">
+            <a:schemeClr val="accent1"/>
+          </a:effectRef>
+          <a:fontRef idx="minor">
+            <a:schemeClr val="tx1"/>
+          </a:fontRef>
+        </p:style>
+      </p:cxnSp>
+      <p:sp>
+        <p:nvSpPr>
+          <p:cNvPr id="66" name="TextBox 65">
+            <a:extLst>
+              <a:ext uri="{FF2B5EF4-FFF2-40B4-BE49-F238E27FC236}">
+                <a16:creationId xmlns:a16="http://schemas.microsoft.com/office/drawing/2014/main" id="{03C6C45F-B741-14BC-4FCA-88FAF3DFA9DD}"/>
+              </a:ext>
+            </a:extLst>
+          </p:cNvPr>
+          <p:cNvSpPr txBox="1"/>
+          <p:nvPr/>
+        </p:nvSpPr>
+        <p:spPr>
+          <a:xfrm>
+            <a:off x="4707065" y="6821662"/>
+            <a:ext cx="1706114" cy="1246495"/>
+          </a:xfrm>
+          <a:prstGeom prst="rect">
+            <a:avLst/>
+          </a:prstGeom>
+          <a:noFill/>
+        </p:spPr>
+        <p:txBody>
+          <a:bodyPr wrap="square" rtlCol="0">
+            <a:spAutoFit/>
+          </a:bodyPr>
+          <a:lstStyle/>
+          <a:p>
+            <a:pPr algn="ctr"/>
+            <a:r>
+              <a:rPr lang="en-GB" sz="2500" dirty="0"/>
+              <a:t>MLE: 0.778 </a:t>
+            </a:r>
+          </a:p>
+          <a:p>
+            <a:pPr algn="ctr"/>
+            <a:r>
+              <a:rPr lang="en-GB" sz="2500" dirty="0"/>
+              <a:t>[95% CI: 0.53, 0.92]</a:t>
+            </a:r>
+            <a:endParaRPr lang="en-CH" sz="2500" dirty="0"/>
+          </a:p>
+        </p:txBody>
+      </p:sp>
+      <p:cxnSp>
+        <p:nvCxnSpPr>
+          <p:cNvPr id="67" name="Straight Connector 66">
+            <a:extLst>
+              <a:ext uri="{FF2B5EF4-FFF2-40B4-BE49-F238E27FC236}">
+                <a16:creationId xmlns:a16="http://schemas.microsoft.com/office/drawing/2014/main" id="{EF7F93C8-A5CD-61B0-CA3E-89C9A72D79A8}"/>
+              </a:ext>
+            </a:extLst>
+          </p:cNvPr>
+          <p:cNvCxnSpPr>
+            <a:cxnSpLocks/>
+          </p:cNvCxnSpPr>
+          <p:nvPr/>
+        </p:nvCxnSpPr>
+        <p:spPr>
+          <a:xfrm>
+            <a:off x="5044911" y="8400200"/>
+            <a:ext cx="2880000" cy="0"/>
+          </a:xfrm>
+          <a:prstGeom prst="line">
+            <a:avLst/>
+          </a:prstGeom>
+          <a:ln w="25400">
+            <a:solidFill>
               <a:schemeClr val="tx1"/>
-            </a:fontRef>
-          </p:style>
-        </p:cxnSp>
-      </p:grpSp>
+            </a:solidFill>
+          </a:ln>
+        </p:spPr>
+        <p:style>
+          <a:lnRef idx="1">
+            <a:schemeClr val="accent1"/>
+          </a:lnRef>
+          <a:fillRef idx="0">
+            <a:schemeClr val="accent1"/>
+          </a:fillRef>
+          <a:effectRef idx="0">
+            <a:schemeClr val="accent1"/>
+          </a:effectRef>
+          <a:fontRef idx="minor">
+            <a:schemeClr val="tx1"/>
+          </a:fontRef>
+        </p:style>
+      </p:cxnSp>
+      <p:cxnSp>
+        <p:nvCxnSpPr>
+          <p:cNvPr id="2" name="Straight Connector 1">
+            <a:extLst>
+              <a:ext uri="{FF2B5EF4-FFF2-40B4-BE49-F238E27FC236}">
+                <a16:creationId xmlns:a16="http://schemas.microsoft.com/office/drawing/2014/main" id="{A5172A66-3F09-4E88-96FC-CA9E57383DA0}"/>
+              </a:ext>
+            </a:extLst>
+          </p:cNvPr>
+          <p:cNvCxnSpPr>
+            <a:cxnSpLocks/>
+          </p:cNvCxnSpPr>
+          <p:nvPr/>
+        </p:nvCxnSpPr>
+        <p:spPr>
+          <a:xfrm>
+            <a:off x="11868094" y="8299338"/>
+            <a:ext cx="915774" cy="0"/>
+          </a:xfrm>
+          <a:prstGeom prst="line">
+            <a:avLst/>
+          </a:prstGeom>
+          <a:ln w="127000">
+            <a:solidFill>
+              <a:schemeClr val="tx1"/>
+            </a:solidFill>
+          </a:ln>
+        </p:spPr>
+        <p:style>
+          <a:lnRef idx="1">
+            <a:schemeClr val="accent1"/>
+          </a:lnRef>
+          <a:fillRef idx="0">
+            <a:schemeClr val="accent1"/>
+          </a:fillRef>
+          <a:effectRef idx="0">
+            <a:schemeClr val="accent1"/>
+          </a:effectRef>
+          <a:fontRef idx="minor">
+            <a:schemeClr val="tx1"/>
+          </a:fontRef>
+        </p:style>
+      </p:cxnSp>
     </p:spTree>
     <p:extLst>
       <p:ext uri="{BB962C8B-B14F-4D97-AF65-F5344CB8AC3E}">

</xml_diff>